<commit_message>
New Window for Dataloader
</commit_message>
<xml_diff>
--- a/Images/GUI_progress_bar_Demonstrator/progress_bar_demonstrator.pptx
+++ b/Images/GUI_progress_bar_Demonstrator/progress_bar_demonstrator.pptx
@@ -8,6 +8,7 @@
     <p:sldId id="271" r:id="rId2"/>
     <p:sldId id="272" r:id="rId3"/>
     <p:sldId id="273" r:id="rId4"/>
+    <p:sldId id="274" r:id="rId5"/>
   </p:sldIdLst>
   <p:sldSz cx="12192000" cy="6858000"/>
   <p:notesSz cx="6858000" cy="9144000"/>
@@ -256,7 +257,7 @@
           <a:p>
             <a:fld id="{8487EC4D-881D-49D9-96DC-4A50E5093F85}" type="datetimeFigureOut">
               <a:rPr lang="de-DE" smtClean="0"/>
-              <a:t>09.07.2020</a:t>
+              <a:t>11.06.2021</a:t>
             </a:fld>
             <a:endParaRPr lang="de-DE"/>
           </a:p>
@@ -426,7 +427,7 @@
           <a:p>
             <a:fld id="{8487EC4D-881D-49D9-96DC-4A50E5093F85}" type="datetimeFigureOut">
               <a:rPr lang="de-DE" smtClean="0"/>
-              <a:t>09.07.2020</a:t>
+              <a:t>11.06.2021</a:t>
             </a:fld>
             <a:endParaRPr lang="de-DE"/>
           </a:p>
@@ -606,7 +607,7 @@
           <a:p>
             <a:fld id="{8487EC4D-881D-49D9-96DC-4A50E5093F85}" type="datetimeFigureOut">
               <a:rPr lang="de-DE" smtClean="0"/>
-              <a:t>09.07.2020</a:t>
+              <a:t>11.06.2021</a:t>
             </a:fld>
             <a:endParaRPr lang="de-DE"/>
           </a:p>
@@ -776,7 +777,7 @@
           <a:p>
             <a:fld id="{8487EC4D-881D-49D9-96DC-4A50E5093F85}" type="datetimeFigureOut">
               <a:rPr lang="de-DE" smtClean="0"/>
-              <a:t>09.07.2020</a:t>
+              <a:t>11.06.2021</a:t>
             </a:fld>
             <a:endParaRPr lang="de-DE"/>
           </a:p>
@@ -1022,7 +1023,7 @@
           <a:p>
             <a:fld id="{8487EC4D-881D-49D9-96DC-4A50E5093F85}" type="datetimeFigureOut">
               <a:rPr lang="de-DE" smtClean="0"/>
-              <a:t>09.07.2020</a:t>
+              <a:t>11.06.2021</a:t>
             </a:fld>
             <a:endParaRPr lang="de-DE"/>
           </a:p>
@@ -1254,7 +1255,7 @@
           <a:p>
             <a:fld id="{8487EC4D-881D-49D9-96DC-4A50E5093F85}" type="datetimeFigureOut">
               <a:rPr lang="de-DE" smtClean="0"/>
-              <a:t>09.07.2020</a:t>
+              <a:t>11.06.2021</a:t>
             </a:fld>
             <a:endParaRPr lang="de-DE"/>
           </a:p>
@@ -1621,7 +1622,7 @@
           <a:p>
             <a:fld id="{8487EC4D-881D-49D9-96DC-4A50E5093F85}" type="datetimeFigureOut">
               <a:rPr lang="de-DE" smtClean="0"/>
-              <a:t>09.07.2020</a:t>
+              <a:t>11.06.2021</a:t>
             </a:fld>
             <a:endParaRPr lang="de-DE"/>
           </a:p>
@@ -1739,7 +1740,7 @@
           <a:p>
             <a:fld id="{8487EC4D-881D-49D9-96DC-4A50E5093F85}" type="datetimeFigureOut">
               <a:rPr lang="de-DE" smtClean="0"/>
-              <a:t>09.07.2020</a:t>
+              <a:t>11.06.2021</a:t>
             </a:fld>
             <a:endParaRPr lang="de-DE"/>
           </a:p>
@@ -1834,7 +1835,7 @@
           <a:p>
             <a:fld id="{8487EC4D-881D-49D9-96DC-4A50E5093F85}" type="datetimeFigureOut">
               <a:rPr lang="de-DE" smtClean="0"/>
-              <a:t>09.07.2020</a:t>
+              <a:t>11.06.2021</a:t>
             </a:fld>
             <a:endParaRPr lang="de-DE"/>
           </a:p>
@@ -2111,7 +2112,7 @@
           <a:p>
             <a:fld id="{8487EC4D-881D-49D9-96DC-4A50E5093F85}" type="datetimeFigureOut">
               <a:rPr lang="de-DE" smtClean="0"/>
-              <a:t>09.07.2020</a:t>
+              <a:t>11.06.2021</a:t>
             </a:fld>
             <a:endParaRPr lang="de-DE"/>
           </a:p>
@@ -2368,7 +2369,7 @@
           <a:p>
             <a:fld id="{8487EC4D-881D-49D9-96DC-4A50E5093F85}" type="datetimeFigureOut">
               <a:rPr lang="de-DE" smtClean="0"/>
-              <a:t>09.07.2020</a:t>
+              <a:t>11.06.2021</a:t>
             </a:fld>
             <a:endParaRPr lang="de-DE"/>
           </a:p>
@@ -2433,9 +2434,12 @@
 <p:sldMaster xmlns:a="http://schemas.openxmlformats.org/drawingml/2006/main" xmlns:r="http://schemas.openxmlformats.org/officeDocument/2006/relationships" xmlns:p="http://schemas.openxmlformats.org/presentationml/2006/main">
   <p:cSld>
     <p:bg>
-      <p:bgRef idx="1001">
-        <a:schemeClr val="bg1"/>
-      </p:bgRef>
+      <p:bgPr>
+        <a:solidFill>
+          <a:srgbClr val="2D2D2D"/>
+        </a:solidFill>
+        <a:effectLst/>
+      </p:bgPr>
     </p:bg>
     <p:spTree>
       <p:nvGrpSpPr>
@@ -2581,7 +2585,7 @@
           <a:p>
             <a:fld id="{8487EC4D-881D-49D9-96DC-4A50E5093F85}" type="datetimeFigureOut">
               <a:rPr lang="de-DE" smtClean="0"/>
-              <a:t>09.07.2020</a:t>
+              <a:t>11.06.2021</a:t>
             </a:fld>
             <a:endParaRPr lang="de-DE"/>
           </a:p>
@@ -2988,10 +2992,10 @@
       </p:grpSpPr>
       <p:grpSp>
         <p:nvGrpSpPr>
-          <p:cNvPr id="2" name="Gruppieren 1">
+          <p:cNvPr id="5" name="Gruppieren 4">
             <a:extLst>
               <a:ext uri="{FF2B5EF4-FFF2-40B4-BE49-F238E27FC236}">
-                <a16:creationId xmlns:a16="http://schemas.microsoft.com/office/drawing/2014/main" id="{94BE27B7-1E0F-4CE4-B1E6-592A9838A436}"/>
+                <a16:creationId xmlns:a16="http://schemas.microsoft.com/office/drawing/2014/main" id="{1E6CB149-1068-4EE7-9969-00637598BD11}"/>
               </a:ext>
             </a:extLst>
           </p:cNvPr>
@@ -3000,12 +3004,60 @@
         </p:nvGrpSpPr>
         <p:grpSpPr>
           <a:xfrm>
-            <a:off x="5520000" y="3393000"/>
-            <a:ext cx="1152000" cy="72000"/>
-            <a:chOff x="4980000" y="3393000"/>
-            <a:chExt cx="1152000" cy="72000"/>
+            <a:off x="5250000" y="3393000"/>
+            <a:ext cx="1692000" cy="72000"/>
+            <a:chOff x="5520000" y="3393000"/>
+            <a:chExt cx="1692000" cy="72000"/>
           </a:xfrm>
         </p:grpSpPr>
+        <p:cxnSp>
+          <p:nvCxnSpPr>
+            <p:cNvPr id="8" name="Gerader Verbinder 7">
+              <a:extLst>
+                <a:ext uri="{FF2B5EF4-FFF2-40B4-BE49-F238E27FC236}">
+                  <a16:creationId xmlns:a16="http://schemas.microsoft.com/office/drawing/2014/main" id="{BDE39839-7092-446E-B42C-9654B7029445}"/>
+                </a:ext>
+              </a:extLst>
+            </p:cNvPr>
+            <p:cNvCxnSpPr>
+              <a:cxnSpLocks/>
+              <a:stCxn id="9" idx="2"/>
+              <a:endCxn id="28" idx="6"/>
+            </p:cNvCxnSpPr>
+            <p:nvPr/>
+          </p:nvCxnSpPr>
+          <p:spPr>
+            <a:xfrm flipH="1">
+              <a:off x="6672000" y="3429000"/>
+              <a:ext cx="468000" cy="0"/>
+            </a:xfrm>
+            <a:prstGeom prst="line">
+              <a:avLst/>
+            </a:prstGeom>
+            <a:solidFill>
+              <a:srgbClr val="232323"/>
+            </a:solidFill>
+            <a:ln w="28575">
+              <a:solidFill>
+                <a:srgbClr val="232323"/>
+              </a:solidFill>
+            </a:ln>
+          </p:spPr>
+          <p:style>
+            <a:lnRef idx="1">
+              <a:schemeClr val="accent1"/>
+            </a:lnRef>
+            <a:fillRef idx="0">
+              <a:schemeClr val="accent1"/>
+            </a:fillRef>
+            <a:effectRef idx="0">
+              <a:schemeClr val="accent1"/>
+            </a:effectRef>
+            <a:fontRef idx="minor">
+              <a:schemeClr val="tx1"/>
+            </a:fontRef>
+          </p:style>
+        </p:cxnSp>
         <p:cxnSp>
           <p:nvCxnSpPr>
             <p:cNvPr id="23" name="Gerader Verbinder 22"/>
@@ -3018,7 +3070,7 @@
           </p:nvCxnSpPr>
           <p:spPr>
             <a:xfrm flipH="1">
-              <a:off x="5052000" y="3429000"/>
+              <a:off x="5592000" y="3429000"/>
               <a:ext cx="468000" cy="0"/>
             </a:xfrm>
             <a:prstGeom prst="line">
@@ -3066,7 +3118,7 @@
           </p:nvCxnSpPr>
           <p:spPr>
             <a:xfrm flipH="1">
-              <a:off x="5592000" y="3429000"/>
+              <a:off x="6132000" y="3429000"/>
               <a:ext cx="468000" cy="0"/>
             </a:xfrm>
             <a:prstGeom prst="line">
@@ -3104,7 +3156,7 @@
           </p:nvSpPr>
           <p:spPr>
             <a:xfrm>
-              <a:off x="4980000" y="3393000"/>
+              <a:off x="5520000" y="3393000"/>
               <a:ext cx="72000" cy="72000"/>
             </a:xfrm>
             <a:prstGeom prst="ellipse">
@@ -3164,7 +3216,7 @@
           </p:nvSpPr>
           <p:spPr>
             <a:xfrm>
-              <a:off x="5520000" y="3393000"/>
+              <a:off x="6060000" y="3393000"/>
               <a:ext cx="72000" cy="72000"/>
             </a:xfrm>
             <a:prstGeom prst="ellipse">
@@ -3224,7 +3276,67 @@
           </p:nvSpPr>
           <p:spPr>
             <a:xfrm>
-              <a:off x="6060000" y="3393000"/>
+              <a:off x="6600000" y="3393000"/>
+              <a:ext cx="72000" cy="72000"/>
+            </a:xfrm>
+            <a:prstGeom prst="ellipse">
+              <a:avLst/>
+            </a:prstGeom>
+            <a:solidFill>
+              <a:srgbClr val="232323"/>
+            </a:solidFill>
+            <a:ln w="38100">
+              <a:solidFill>
+                <a:srgbClr val="232323"/>
+              </a:solidFill>
+            </a:ln>
+          </p:spPr>
+          <p:style>
+            <a:lnRef idx="2">
+              <a:schemeClr val="accent1">
+                <a:shade val="50000"/>
+              </a:schemeClr>
+            </a:lnRef>
+            <a:fillRef idx="1">
+              <a:schemeClr val="accent1"/>
+            </a:fillRef>
+            <a:effectRef idx="0">
+              <a:schemeClr val="accent1"/>
+            </a:effectRef>
+            <a:fontRef idx="minor">
+              <a:schemeClr val="lt1"/>
+            </a:fontRef>
+          </p:style>
+          <p:txBody>
+            <a:bodyPr rtlCol="0" anchor="ctr"/>
+            <a:lstStyle/>
+            <a:p>
+              <a:pPr algn="ctr"/>
+              <a:endParaRPr lang="de-DE">
+                <a:ln>
+                  <a:solidFill>
+                    <a:sysClr val="windowText" lastClr="000000"/>
+                  </a:solidFill>
+                </a:ln>
+              </a:endParaRPr>
+            </a:p>
+          </p:txBody>
+        </p:sp>
+        <p:sp>
+          <p:nvSpPr>
+            <p:cNvPr id="9" name="Ellipse 8">
+              <a:extLst>
+                <a:ext uri="{FF2B5EF4-FFF2-40B4-BE49-F238E27FC236}">
+                  <a16:creationId xmlns:a16="http://schemas.microsoft.com/office/drawing/2014/main" id="{679C5813-72C1-4B52-90FF-F57E4B94BF9A}"/>
+                </a:ext>
+              </a:extLst>
+            </p:cNvPr>
+            <p:cNvSpPr/>
+            <p:nvPr/>
+          </p:nvSpPr>
+          <p:spPr>
+            <a:xfrm>
+              <a:off x="7140000" y="3393000"/>
               <a:ext cx="72000" cy="72000"/>
             </a:xfrm>
             <a:prstGeom prst="ellipse">
@@ -3303,10 +3415,10 @@
       </p:grpSpPr>
       <p:grpSp>
         <p:nvGrpSpPr>
-          <p:cNvPr id="2" name="Gruppieren 1">
+          <p:cNvPr id="5" name="Gruppieren 4">
             <a:extLst>
               <a:ext uri="{FF2B5EF4-FFF2-40B4-BE49-F238E27FC236}">
-                <a16:creationId xmlns:a16="http://schemas.microsoft.com/office/drawing/2014/main" id="{0871E60E-848E-488C-B465-33DAF80389EC}"/>
+                <a16:creationId xmlns:a16="http://schemas.microsoft.com/office/drawing/2014/main" id="{1E6CB149-1068-4EE7-9969-00637598BD11}"/>
               </a:ext>
             </a:extLst>
           </p:cNvPr>
@@ -3315,12 +3427,60 @@
         </p:nvGrpSpPr>
         <p:grpSpPr>
           <a:xfrm>
-            <a:off x="5520000" y="3393000"/>
-            <a:ext cx="1152000" cy="72000"/>
-            <a:chOff x="4980000" y="3393000"/>
-            <a:chExt cx="1152000" cy="72000"/>
+            <a:off x="5250000" y="3393000"/>
+            <a:ext cx="1692000" cy="72000"/>
+            <a:chOff x="5520000" y="3393000"/>
+            <a:chExt cx="1692000" cy="72000"/>
           </a:xfrm>
         </p:grpSpPr>
+        <p:cxnSp>
+          <p:nvCxnSpPr>
+            <p:cNvPr id="8" name="Gerader Verbinder 7">
+              <a:extLst>
+                <a:ext uri="{FF2B5EF4-FFF2-40B4-BE49-F238E27FC236}">
+                  <a16:creationId xmlns:a16="http://schemas.microsoft.com/office/drawing/2014/main" id="{BDE39839-7092-446E-B42C-9654B7029445}"/>
+                </a:ext>
+              </a:extLst>
+            </p:cNvPr>
+            <p:cNvCxnSpPr>
+              <a:cxnSpLocks/>
+              <a:stCxn id="9" idx="2"/>
+              <a:endCxn id="28" idx="6"/>
+            </p:cNvCxnSpPr>
+            <p:nvPr/>
+          </p:nvCxnSpPr>
+          <p:spPr>
+            <a:xfrm flipH="1">
+              <a:off x="6672000" y="3429000"/>
+              <a:ext cx="468000" cy="0"/>
+            </a:xfrm>
+            <a:prstGeom prst="line">
+              <a:avLst/>
+            </a:prstGeom>
+            <a:solidFill>
+              <a:srgbClr val="232323"/>
+            </a:solidFill>
+            <a:ln w="28575">
+              <a:solidFill>
+                <a:srgbClr val="232323"/>
+              </a:solidFill>
+            </a:ln>
+          </p:spPr>
+          <p:style>
+            <a:lnRef idx="1">
+              <a:schemeClr val="accent1"/>
+            </a:lnRef>
+            <a:fillRef idx="0">
+              <a:schemeClr val="accent1"/>
+            </a:fillRef>
+            <a:effectRef idx="0">
+              <a:schemeClr val="accent1"/>
+            </a:effectRef>
+            <a:fontRef idx="minor">
+              <a:schemeClr val="tx1"/>
+            </a:fontRef>
+          </p:style>
+        </p:cxnSp>
         <p:cxnSp>
           <p:nvCxnSpPr>
             <p:cNvPr id="23" name="Gerader Verbinder 22"/>
@@ -3333,7 +3493,7 @@
           </p:nvCxnSpPr>
           <p:spPr>
             <a:xfrm flipH="1">
-              <a:off x="5052000" y="3429000"/>
+              <a:off x="5592000" y="3429000"/>
               <a:ext cx="468000" cy="0"/>
             </a:xfrm>
             <a:prstGeom prst="line">
@@ -3381,7 +3541,7 @@
           </p:nvCxnSpPr>
           <p:spPr>
             <a:xfrm flipH="1">
-              <a:off x="5592000" y="3429000"/>
+              <a:off x="6132000" y="3429000"/>
               <a:ext cx="468000" cy="0"/>
             </a:xfrm>
             <a:prstGeom prst="line">
@@ -3419,7 +3579,7 @@
           </p:nvSpPr>
           <p:spPr>
             <a:xfrm>
-              <a:off x="4980000" y="3393000"/>
+              <a:off x="5520000" y="3393000"/>
               <a:ext cx="72000" cy="72000"/>
             </a:xfrm>
             <a:prstGeom prst="ellipse">
@@ -3479,7 +3639,7 @@
           </p:nvSpPr>
           <p:spPr>
             <a:xfrm>
-              <a:off x="5520000" y="3393000"/>
+              <a:off x="6060000" y="3393000"/>
               <a:ext cx="72000" cy="72000"/>
             </a:xfrm>
             <a:prstGeom prst="ellipse">
@@ -3539,7 +3699,67 @@
           </p:nvSpPr>
           <p:spPr>
             <a:xfrm>
-              <a:off x="6060000" y="3393000"/>
+              <a:off x="6600000" y="3393000"/>
+              <a:ext cx="72000" cy="72000"/>
+            </a:xfrm>
+            <a:prstGeom prst="ellipse">
+              <a:avLst/>
+            </a:prstGeom>
+            <a:solidFill>
+              <a:srgbClr val="232323"/>
+            </a:solidFill>
+            <a:ln w="38100">
+              <a:solidFill>
+                <a:srgbClr val="232323"/>
+              </a:solidFill>
+            </a:ln>
+          </p:spPr>
+          <p:style>
+            <a:lnRef idx="2">
+              <a:schemeClr val="accent1">
+                <a:shade val="50000"/>
+              </a:schemeClr>
+            </a:lnRef>
+            <a:fillRef idx="1">
+              <a:schemeClr val="accent1"/>
+            </a:fillRef>
+            <a:effectRef idx="0">
+              <a:schemeClr val="accent1"/>
+            </a:effectRef>
+            <a:fontRef idx="minor">
+              <a:schemeClr val="lt1"/>
+            </a:fontRef>
+          </p:style>
+          <p:txBody>
+            <a:bodyPr rtlCol="0" anchor="ctr"/>
+            <a:lstStyle/>
+            <a:p>
+              <a:pPr algn="ctr"/>
+              <a:endParaRPr lang="de-DE">
+                <a:ln>
+                  <a:solidFill>
+                    <a:sysClr val="windowText" lastClr="000000"/>
+                  </a:solidFill>
+                </a:ln>
+              </a:endParaRPr>
+            </a:p>
+          </p:txBody>
+        </p:sp>
+        <p:sp>
+          <p:nvSpPr>
+            <p:cNvPr id="9" name="Ellipse 8">
+              <a:extLst>
+                <a:ext uri="{FF2B5EF4-FFF2-40B4-BE49-F238E27FC236}">
+                  <a16:creationId xmlns:a16="http://schemas.microsoft.com/office/drawing/2014/main" id="{679C5813-72C1-4B52-90FF-F57E4B94BF9A}"/>
+                </a:ext>
+              </a:extLst>
+            </p:cNvPr>
+            <p:cNvSpPr/>
+            <p:nvPr/>
+          </p:nvSpPr>
+          <p:spPr>
+            <a:xfrm>
+              <a:off x="7140000" y="3393000"/>
               <a:ext cx="72000" cy="72000"/>
             </a:xfrm>
             <a:prstGeom prst="ellipse">
@@ -3589,7 +3809,7 @@
     </p:spTree>
     <p:extLst>
       <p:ext uri="{BB962C8B-B14F-4D97-AF65-F5344CB8AC3E}">
-        <p14:creationId xmlns:p14="http://schemas.microsoft.com/office/powerpoint/2010/main" val="3931475757"/>
+        <p14:creationId xmlns:p14="http://schemas.microsoft.com/office/powerpoint/2010/main" val="3159749248"/>
       </p:ext>
     </p:extLst>
   </p:cSld>
@@ -3618,10 +3838,10 @@
       </p:grpSpPr>
       <p:grpSp>
         <p:nvGrpSpPr>
-          <p:cNvPr id="2" name="Gruppieren 1">
+          <p:cNvPr id="5" name="Gruppieren 4">
             <a:extLst>
               <a:ext uri="{FF2B5EF4-FFF2-40B4-BE49-F238E27FC236}">
-                <a16:creationId xmlns:a16="http://schemas.microsoft.com/office/drawing/2014/main" id="{69488D3F-DEE9-4831-BB41-E02D9517AB0C}"/>
+                <a16:creationId xmlns:a16="http://schemas.microsoft.com/office/drawing/2014/main" id="{1E6CB149-1068-4EE7-9969-00637598BD11}"/>
               </a:ext>
             </a:extLst>
           </p:cNvPr>
@@ -3630,12 +3850,60 @@
         </p:nvGrpSpPr>
         <p:grpSpPr>
           <a:xfrm>
-            <a:off x="5520000" y="3393000"/>
-            <a:ext cx="1152000" cy="72000"/>
-            <a:chOff x="4980000" y="3393000"/>
-            <a:chExt cx="1152000" cy="72000"/>
+            <a:off x="5250000" y="3393000"/>
+            <a:ext cx="1692000" cy="72000"/>
+            <a:chOff x="5520000" y="3393000"/>
+            <a:chExt cx="1692000" cy="72000"/>
           </a:xfrm>
         </p:grpSpPr>
+        <p:cxnSp>
+          <p:nvCxnSpPr>
+            <p:cNvPr id="8" name="Gerader Verbinder 7">
+              <a:extLst>
+                <a:ext uri="{FF2B5EF4-FFF2-40B4-BE49-F238E27FC236}">
+                  <a16:creationId xmlns:a16="http://schemas.microsoft.com/office/drawing/2014/main" id="{BDE39839-7092-446E-B42C-9654B7029445}"/>
+                </a:ext>
+              </a:extLst>
+            </p:cNvPr>
+            <p:cNvCxnSpPr>
+              <a:cxnSpLocks/>
+              <a:stCxn id="9" idx="2"/>
+              <a:endCxn id="28" idx="6"/>
+            </p:cNvCxnSpPr>
+            <p:nvPr/>
+          </p:nvCxnSpPr>
+          <p:spPr>
+            <a:xfrm flipH="1">
+              <a:off x="6672000" y="3429000"/>
+              <a:ext cx="468000" cy="0"/>
+            </a:xfrm>
+            <a:prstGeom prst="line">
+              <a:avLst/>
+            </a:prstGeom>
+            <a:solidFill>
+              <a:srgbClr val="232323"/>
+            </a:solidFill>
+            <a:ln w="28575">
+              <a:solidFill>
+                <a:srgbClr val="232323"/>
+              </a:solidFill>
+            </a:ln>
+          </p:spPr>
+          <p:style>
+            <a:lnRef idx="1">
+              <a:schemeClr val="accent1"/>
+            </a:lnRef>
+            <a:fillRef idx="0">
+              <a:schemeClr val="accent1"/>
+            </a:fillRef>
+            <a:effectRef idx="0">
+              <a:schemeClr val="accent1"/>
+            </a:effectRef>
+            <a:fontRef idx="minor">
+              <a:schemeClr val="tx1"/>
+            </a:fontRef>
+          </p:style>
+        </p:cxnSp>
         <p:cxnSp>
           <p:nvCxnSpPr>
             <p:cNvPr id="23" name="Gerader Verbinder 22"/>
@@ -3648,7 +3916,7 @@
           </p:nvCxnSpPr>
           <p:spPr>
             <a:xfrm flipH="1">
-              <a:off x="5052000" y="3429000"/>
+              <a:off x="5592000" y="3429000"/>
               <a:ext cx="468000" cy="0"/>
             </a:xfrm>
             <a:prstGeom prst="line">
@@ -3696,7 +3964,7 @@
           </p:nvCxnSpPr>
           <p:spPr>
             <a:xfrm flipH="1">
-              <a:off x="5592000" y="3429000"/>
+              <a:off x="6132000" y="3429000"/>
               <a:ext cx="468000" cy="0"/>
             </a:xfrm>
             <a:prstGeom prst="line">
@@ -3734,7 +4002,7 @@
           </p:nvSpPr>
           <p:spPr>
             <a:xfrm>
-              <a:off x="4980000" y="3393000"/>
+              <a:off x="5520000" y="3393000"/>
               <a:ext cx="72000" cy="72000"/>
             </a:xfrm>
             <a:prstGeom prst="ellipse">
@@ -3794,7 +4062,7 @@
           </p:nvSpPr>
           <p:spPr>
             <a:xfrm>
-              <a:off x="5520000" y="3393000"/>
+              <a:off x="6060000" y="3393000"/>
               <a:ext cx="72000" cy="72000"/>
             </a:xfrm>
             <a:prstGeom prst="ellipse">
@@ -3854,7 +4122,7 @@
           </p:nvSpPr>
           <p:spPr>
             <a:xfrm>
-              <a:off x="6060000" y="3393000"/>
+              <a:off x="6600000" y="3393000"/>
               <a:ext cx="72000" cy="72000"/>
             </a:xfrm>
             <a:prstGeom prst="ellipse">
@@ -3866,6 +4134,66 @@
             <a:ln w="38100">
               <a:solidFill>
                 <a:srgbClr val="2A82DA"/>
+              </a:solidFill>
+            </a:ln>
+          </p:spPr>
+          <p:style>
+            <a:lnRef idx="2">
+              <a:schemeClr val="accent1">
+                <a:shade val="50000"/>
+              </a:schemeClr>
+            </a:lnRef>
+            <a:fillRef idx="1">
+              <a:schemeClr val="accent1"/>
+            </a:fillRef>
+            <a:effectRef idx="0">
+              <a:schemeClr val="accent1"/>
+            </a:effectRef>
+            <a:fontRef idx="minor">
+              <a:schemeClr val="lt1"/>
+            </a:fontRef>
+          </p:style>
+          <p:txBody>
+            <a:bodyPr rtlCol="0" anchor="ctr"/>
+            <a:lstStyle/>
+            <a:p>
+              <a:pPr algn="ctr"/>
+              <a:endParaRPr lang="de-DE">
+                <a:ln>
+                  <a:solidFill>
+                    <a:sysClr val="windowText" lastClr="000000"/>
+                  </a:solidFill>
+                </a:ln>
+              </a:endParaRPr>
+            </a:p>
+          </p:txBody>
+        </p:sp>
+        <p:sp>
+          <p:nvSpPr>
+            <p:cNvPr id="9" name="Ellipse 8">
+              <a:extLst>
+                <a:ext uri="{FF2B5EF4-FFF2-40B4-BE49-F238E27FC236}">
+                  <a16:creationId xmlns:a16="http://schemas.microsoft.com/office/drawing/2014/main" id="{679C5813-72C1-4B52-90FF-F57E4B94BF9A}"/>
+                </a:ext>
+              </a:extLst>
+            </p:cNvPr>
+            <p:cNvSpPr/>
+            <p:nvPr/>
+          </p:nvSpPr>
+          <p:spPr>
+            <a:xfrm>
+              <a:off x="7140000" y="3393000"/>
+              <a:ext cx="72000" cy="72000"/>
+            </a:xfrm>
+            <a:prstGeom prst="ellipse">
+              <a:avLst/>
+            </a:prstGeom>
+            <a:solidFill>
+              <a:srgbClr val="232323"/>
+            </a:solidFill>
+            <a:ln w="38100">
+              <a:solidFill>
+                <a:srgbClr val="232323"/>
               </a:solidFill>
             </a:ln>
           </p:spPr>
@@ -3904,7 +4232,430 @@
     </p:spTree>
     <p:extLst>
       <p:ext uri="{BB962C8B-B14F-4D97-AF65-F5344CB8AC3E}">
-        <p14:creationId xmlns:p14="http://schemas.microsoft.com/office/powerpoint/2010/main" val="1199372891"/>
+        <p14:creationId xmlns:p14="http://schemas.microsoft.com/office/powerpoint/2010/main" val="2274043634"/>
+      </p:ext>
+    </p:extLst>
+  </p:cSld>
+  <p:clrMapOvr>
+    <a:masterClrMapping/>
+  </p:clrMapOvr>
+</p:sld>
+</file>
+
+<file path=ppt/slides/slide4.xml><?xml version="1.0" encoding="utf-8"?>
+<p:sld xmlns:a="http://schemas.openxmlformats.org/drawingml/2006/main" xmlns:r="http://schemas.openxmlformats.org/officeDocument/2006/relationships" xmlns:p="http://schemas.openxmlformats.org/presentationml/2006/main">
+  <p:cSld>
+    <p:spTree>
+      <p:nvGrpSpPr>
+        <p:cNvPr id="1" name=""/>
+        <p:cNvGrpSpPr/>
+        <p:nvPr/>
+      </p:nvGrpSpPr>
+      <p:grpSpPr>
+        <a:xfrm>
+          <a:off x="0" y="0"/>
+          <a:ext cx="0" cy="0"/>
+          <a:chOff x="0" y="0"/>
+          <a:chExt cx="0" cy="0"/>
+        </a:xfrm>
+      </p:grpSpPr>
+      <p:grpSp>
+        <p:nvGrpSpPr>
+          <p:cNvPr id="5" name="Gruppieren 4">
+            <a:extLst>
+              <a:ext uri="{FF2B5EF4-FFF2-40B4-BE49-F238E27FC236}">
+                <a16:creationId xmlns:a16="http://schemas.microsoft.com/office/drawing/2014/main" id="{1E6CB149-1068-4EE7-9969-00637598BD11}"/>
+              </a:ext>
+            </a:extLst>
+          </p:cNvPr>
+          <p:cNvGrpSpPr/>
+          <p:nvPr/>
+        </p:nvGrpSpPr>
+        <p:grpSpPr>
+          <a:xfrm>
+            <a:off x="5250000" y="3393000"/>
+            <a:ext cx="1692000" cy="72000"/>
+            <a:chOff x="5520000" y="3393000"/>
+            <a:chExt cx="1692000" cy="72000"/>
+          </a:xfrm>
+        </p:grpSpPr>
+        <p:cxnSp>
+          <p:nvCxnSpPr>
+            <p:cNvPr id="8" name="Gerader Verbinder 7">
+              <a:extLst>
+                <a:ext uri="{FF2B5EF4-FFF2-40B4-BE49-F238E27FC236}">
+                  <a16:creationId xmlns:a16="http://schemas.microsoft.com/office/drawing/2014/main" id="{BDE39839-7092-446E-B42C-9654B7029445}"/>
+                </a:ext>
+              </a:extLst>
+            </p:cNvPr>
+            <p:cNvCxnSpPr>
+              <a:cxnSpLocks/>
+              <a:stCxn id="9" idx="2"/>
+              <a:endCxn id="28" idx="6"/>
+            </p:cNvCxnSpPr>
+            <p:nvPr/>
+          </p:nvCxnSpPr>
+          <p:spPr>
+            <a:xfrm flipH="1">
+              <a:off x="6672000" y="3429000"/>
+              <a:ext cx="468000" cy="0"/>
+            </a:xfrm>
+            <a:prstGeom prst="line">
+              <a:avLst/>
+            </a:prstGeom>
+            <a:solidFill>
+              <a:srgbClr val="2A82DA"/>
+            </a:solidFill>
+            <a:ln w="28575">
+              <a:solidFill>
+                <a:srgbClr val="2A82DA"/>
+              </a:solidFill>
+            </a:ln>
+          </p:spPr>
+          <p:style>
+            <a:lnRef idx="1">
+              <a:schemeClr val="accent1"/>
+            </a:lnRef>
+            <a:fillRef idx="0">
+              <a:schemeClr val="accent1"/>
+            </a:fillRef>
+            <a:effectRef idx="0">
+              <a:schemeClr val="accent1"/>
+            </a:effectRef>
+            <a:fontRef idx="minor">
+              <a:schemeClr val="tx1"/>
+            </a:fontRef>
+          </p:style>
+        </p:cxnSp>
+        <p:cxnSp>
+          <p:nvCxnSpPr>
+            <p:cNvPr id="23" name="Gerader Verbinder 22"/>
+            <p:cNvCxnSpPr>
+              <a:cxnSpLocks/>
+              <a:stCxn id="25" idx="2"/>
+              <a:endCxn id="7" idx="6"/>
+            </p:cNvCxnSpPr>
+            <p:nvPr/>
+          </p:nvCxnSpPr>
+          <p:spPr>
+            <a:xfrm flipH="1">
+              <a:off x="5592000" y="3429000"/>
+              <a:ext cx="468000" cy="0"/>
+            </a:xfrm>
+            <a:prstGeom prst="line">
+              <a:avLst/>
+            </a:prstGeom>
+            <a:solidFill>
+              <a:srgbClr val="2A82DA"/>
+            </a:solidFill>
+            <a:ln w="28575">
+              <a:solidFill>
+                <a:srgbClr val="2A82DA"/>
+              </a:solidFill>
+            </a:ln>
+          </p:spPr>
+          <p:style>
+            <a:lnRef idx="1">
+              <a:schemeClr val="accent1"/>
+            </a:lnRef>
+            <a:fillRef idx="0">
+              <a:schemeClr val="accent1"/>
+            </a:fillRef>
+            <a:effectRef idx="0">
+              <a:schemeClr val="accent1"/>
+            </a:effectRef>
+            <a:fontRef idx="minor">
+              <a:schemeClr val="tx1"/>
+            </a:fontRef>
+          </p:style>
+        </p:cxnSp>
+        <p:cxnSp>
+          <p:nvCxnSpPr>
+            <p:cNvPr id="15" name="Gerader Verbinder 14">
+              <a:extLst>
+                <a:ext uri="{FF2B5EF4-FFF2-40B4-BE49-F238E27FC236}">
+                  <a16:creationId xmlns:a16="http://schemas.microsoft.com/office/drawing/2014/main" id="{3FE5D68D-4180-44E5-B296-4BF77BC51989}"/>
+                </a:ext>
+              </a:extLst>
+            </p:cNvPr>
+            <p:cNvCxnSpPr>
+              <a:cxnSpLocks/>
+              <a:stCxn id="28" idx="2"/>
+              <a:endCxn id="25" idx="6"/>
+            </p:cNvCxnSpPr>
+            <p:nvPr/>
+          </p:nvCxnSpPr>
+          <p:spPr>
+            <a:xfrm flipH="1">
+              <a:off x="6132000" y="3429000"/>
+              <a:ext cx="468000" cy="0"/>
+            </a:xfrm>
+            <a:prstGeom prst="line">
+              <a:avLst/>
+            </a:prstGeom>
+            <a:solidFill>
+              <a:srgbClr val="2A82DA"/>
+            </a:solidFill>
+            <a:ln w="28575">
+              <a:solidFill>
+                <a:srgbClr val="2A82DA"/>
+              </a:solidFill>
+            </a:ln>
+          </p:spPr>
+          <p:style>
+            <a:lnRef idx="1">
+              <a:schemeClr val="accent1"/>
+            </a:lnRef>
+            <a:fillRef idx="0">
+              <a:schemeClr val="accent1"/>
+            </a:fillRef>
+            <a:effectRef idx="0">
+              <a:schemeClr val="accent1"/>
+            </a:effectRef>
+            <a:fontRef idx="minor">
+              <a:schemeClr val="tx1"/>
+            </a:fontRef>
+          </p:style>
+        </p:cxnSp>
+        <p:sp>
+          <p:nvSpPr>
+            <p:cNvPr id="7" name="Ellipse 6"/>
+            <p:cNvSpPr/>
+            <p:nvPr/>
+          </p:nvSpPr>
+          <p:spPr>
+            <a:xfrm>
+              <a:off x="5520000" y="3393000"/>
+              <a:ext cx="72000" cy="72000"/>
+            </a:xfrm>
+            <a:prstGeom prst="ellipse">
+              <a:avLst/>
+            </a:prstGeom>
+            <a:solidFill>
+              <a:srgbClr val="2A82DA"/>
+            </a:solidFill>
+            <a:ln w="38100">
+              <a:solidFill>
+                <a:srgbClr val="2A82DA"/>
+              </a:solidFill>
+            </a:ln>
+          </p:spPr>
+          <p:style>
+            <a:lnRef idx="2">
+              <a:schemeClr val="accent1">
+                <a:shade val="50000"/>
+              </a:schemeClr>
+            </a:lnRef>
+            <a:fillRef idx="1">
+              <a:schemeClr val="accent1"/>
+            </a:fillRef>
+            <a:effectRef idx="0">
+              <a:schemeClr val="accent1"/>
+            </a:effectRef>
+            <a:fontRef idx="minor">
+              <a:schemeClr val="lt1"/>
+            </a:fontRef>
+          </p:style>
+          <p:txBody>
+            <a:bodyPr rtlCol="0" anchor="ctr"/>
+            <a:lstStyle/>
+            <a:p>
+              <a:pPr algn="ctr"/>
+              <a:endParaRPr lang="de-DE">
+                <a:ln>
+                  <a:solidFill>
+                    <a:sysClr val="windowText" lastClr="000000"/>
+                  </a:solidFill>
+                </a:ln>
+              </a:endParaRPr>
+            </a:p>
+          </p:txBody>
+        </p:sp>
+        <p:sp>
+          <p:nvSpPr>
+            <p:cNvPr id="25" name="Ellipse 24">
+              <a:extLst>
+                <a:ext uri="{FF2B5EF4-FFF2-40B4-BE49-F238E27FC236}">
+                  <a16:creationId xmlns:a16="http://schemas.microsoft.com/office/drawing/2014/main" id="{53C71244-523D-49A1-AA2B-AF651BE3C901}"/>
+                </a:ext>
+              </a:extLst>
+            </p:cNvPr>
+            <p:cNvSpPr/>
+            <p:nvPr/>
+          </p:nvSpPr>
+          <p:spPr>
+            <a:xfrm>
+              <a:off x="6060000" y="3393000"/>
+              <a:ext cx="72000" cy="72000"/>
+            </a:xfrm>
+            <a:prstGeom prst="ellipse">
+              <a:avLst/>
+            </a:prstGeom>
+            <a:solidFill>
+              <a:srgbClr val="2A82DA"/>
+            </a:solidFill>
+            <a:ln w="38100">
+              <a:solidFill>
+                <a:srgbClr val="2A82DA"/>
+              </a:solidFill>
+            </a:ln>
+          </p:spPr>
+          <p:style>
+            <a:lnRef idx="2">
+              <a:schemeClr val="accent1">
+                <a:shade val="50000"/>
+              </a:schemeClr>
+            </a:lnRef>
+            <a:fillRef idx="1">
+              <a:schemeClr val="accent1"/>
+            </a:fillRef>
+            <a:effectRef idx="0">
+              <a:schemeClr val="accent1"/>
+            </a:effectRef>
+            <a:fontRef idx="minor">
+              <a:schemeClr val="lt1"/>
+            </a:fontRef>
+          </p:style>
+          <p:txBody>
+            <a:bodyPr rtlCol="0" anchor="ctr"/>
+            <a:lstStyle/>
+            <a:p>
+              <a:pPr algn="ctr"/>
+              <a:endParaRPr lang="de-DE" dirty="0">
+                <a:ln>
+                  <a:solidFill>
+                    <a:sysClr val="windowText" lastClr="000000"/>
+                  </a:solidFill>
+                </a:ln>
+              </a:endParaRPr>
+            </a:p>
+          </p:txBody>
+        </p:sp>
+        <p:sp>
+          <p:nvSpPr>
+            <p:cNvPr id="28" name="Ellipse 27">
+              <a:extLst>
+                <a:ext uri="{FF2B5EF4-FFF2-40B4-BE49-F238E27FC236}">
+                  <a16:creationId xmlns:a16="http://schemas.microsoft.com/office/drawing/2014/main" id="{92ABA44F-D000-4240-A7E6-0C8D7B74E95B}"/>
+                </a:ext>
+              </a:extLst>
+            </p:cNvPr>
+            <p:cNvSpPr/>
+            <p:nvPr/>
+          </p:nvSpPr>
+          <p:spPr>
+            <a:xfrm>
+              <a:off x="6600000" y="3393000"/>
+              <a:ext cx="72000" cy="72000"/>
+            </a:xfrm>
+            <a:prstGeom prst="ellipse">
+              <a:avLst/>
+            </a:prstGeom>
+            <a:solidFill>
+              <a:srgbClr val="2A82DA"/>
+            </a:solidFill>
+            <a:ln w="38100">
+              <a:solidFill>
+                <a:srgbClr val="2A82DA"/>
+              </a:solidFill>
+            </a:ln>
+          </p:spPr>
+          <p:style>
+            <a:lnRef idx="2">
+              <a:schemeClr val="accent1">
+                <a:shade val="50000"/>
+              </a:schemeClr>
+            </a:lnRef>
+            <a:fillRef idx="1">
+              <a:schemeClr val="accent1"/>
+            </a:fillRef>
+            <a:effectRef idx="0">
+              <a:schemeClr val="accent1"/>
+            </a:effectRef>
+            <a:fontRef idx="minor">
+              <a:schemeClr val="lt1"/>
+            </a:fontRef>
+          </p:style>
+          <p:txBody>
+            <a:bodyPr rtlCol="0" anchor="ctr"/>
+            <a:lstStyle/>
+            <a:p>
+              <a:pPr algn="ctr"/>
+              <a:endParaRPr lang="de-DE">
+                <a:ln>
+                  <a:solidFill>
+                    <a:sysClr val="windowText" lastClr="000000"/>
+                  </a:solidFill>
+                </a:ln>
+              </a:endParaRPr>
+            </a:p>
+          </p:txBody>
+        </p:sp>
+        <p:sp>
+          <p:nvSpPr>
+            <p:cNvPr id="9" name="Ellipse 8">
+              <a:extLst>
+                <a:ext uri="{FF2B5EF4-FFF2-40B4-BE49-F238E27FC236}">
+                  <a16:creationId xmlns:a16="http://schemas.microsoft.com/office/drawing/2014/main" id="{679C5813-72C1-4B52-90FF-F57E4B94BF9A}"/>
+                </a:ext>
+              </a:extLst>
+            </p:cNvPr>
+            <p:cNvSpPr/>
+            <p:nvPr/>
+          </p:nvSpPr>
+          <p:spPr>
+            <a:xfrm>
+              <a:off x="7140000" y="3393000"/>
+              <a:ext cx="72000" cy="72000"/>
+            </a:xfrm>
+            <a:prstGeom prst="ellipse">
+              <a:avLst/>
+            </a:prstGeom>
+            <a:solidFill>
+              <a:srgbClr val="2A82DA"/>
+            </a:solidFill>
+            <a:ln w="38100">
+              <a:solidFill>
+                <a:srgbClr val="2A82DA"/>
+              </a:solidFill>
+            </a:ln>
+          </p:spPr>
+          <p:style>
+            <a:lnRef idx="2">
+              <a:schemeClr val="accent1">
+                <a:shade val="50000"/>
+              </a:schemeClr>
+            </a:lnRef>
+            <a:fillRef idx="1">
+              <a:schemeClr val="accent1"/>
+            </a:fillRef>
+            <a:effectRef idx="0">
+              <a:schemeClr val="accent1"/>
+            </a:effectRef>
+            <a:fontRef idx="minor">
+              <a:schemeClr val="lt1"/>
+            </a:fontRef>
+          </p:style>
+          <p:txBody>
+            <a:bodyPr rtlCol="0" anchor="ctr"/>
+            <a:lstStyle/>
+            <a:p>
+              <a:pPr algn="ctr"/>
+              <a:endParaRPr lang="de-DE">
+                <a:ln>
+                  <a:solidFill>
+                    <a:sysClr val="windowText" lastClr="000000"/>
+                  </a:solidFill>
+                </a:ln>
+              </a:endParaRPr>
+            </a:p>
+          </p:txBody>
+        </p:sp>
+      </p:grpSp>
+    </p:spTree>
+    <p:extLst>
+      <p:ext uri="{BB962C8B-B14F-4D97-AF65-F5344CB8AC3E}">
+        <p14:creationId xmlns:p14="http://schemas.microsoft.com/office/powerpoint/2010/main" val="4170881507"/>
       </p:ext>
     </p:extLst>
   </p:cSld>

</xml_diff>